<commit_message>
Added episode 32b - Added Decorator Pattern
</commit_message>
<xml_diff>
--- a/Presentations/32a- Clean Code - Design Patterns - Singleton Pattern.pptx
+++ b/Presentations/32a- Clean Code - Design Patterns - Singleton Pattern.pptx
@@ -5,10 +5,10 @@
     <p:sldMasterId id="2147483648" r:id="rId4"/>
   </p:sldMasterIdLst>
   <p:notesMasterIdLst>
-    <p:notesMasterId r:id="rId15"/>
+    <p:notesMasterId r:id="rId17"/>
   </p:notesMasterIdLst>
   <p:handoutMasterIdLst>
-    <p:handoutMasterId r:id="rId16"/>
+    <p:handoutMasterId r:id="rId18"/>
   </p:handoutMasterIdLst>
   <p:sldIdLst>
     <p:sldId id="449" r:id="rId5"/>
@@ -20,12 +20,14 @@
     <p:sldId id="476" r:id="rId11"/>
     <p:sldId id="477" r:id="rId12"/>
     <p:sldId id="478" r:id="rId13"/>
-    <p:sldId id="422" r:id="rId14"/>
+    <p:sldId id="479" r:id="rId14"/>
+    <p:sldId id="480" r:id="rId15"/>
+    <p:sldId id="422" r:id="rId16"/>
   </p:sldIdLst>
   <p:sldSz cx="12192000" cy="6858000"/>
   <p:notesSz cx="6858000" cy="9144000"/>
   <p:custDataLst>
-    <p:tags r:id="rId17"/>
+    <p:tags r:id="rId19"/>
   </p:custDataLst>
   <p:defaultTextStyle>
     <a:defPPr>
@@ -241,7 +243,7 @@
           <a:p>
             <a:fld id="{D54D4046-5866-459D-BEB5-A0B0377E3E3F}" type="datetime1">
               <a:rPr lang="en-US" sz="1000" smtClean="0"/>
-              <a:t>2/17/23</a:t>
+              <a:t>2/19/23</a:t>
             </a:fld>
             <a:endParaRPr lang="en-US" sz="1000"/>
           </a:p>
@@ -390,7 +392,7 @@
           <a:p>
             <a:fld id="{86CA08A8-CD0A-4CED-A7DF-8FE5DAE0B145}" type="datetime1">
               <a:rPr lang="en-US" smtClean="0"/>
-              <a:t>2/17/23</a:t>
+              <a:t>2/19/23</a:t>
             </a:fld>
             <a:endParaRPr lang="en-US" dirty="0"/>
           </a:p>
@@ -756,7 +758,7 @@
           <a:p>
             <a:fld id="{3CB1730B-F0FD-4857-ADC5-05FFCBB96A2D}" type="datetime1">
               <a:rPr lang="en-US" smtClean="0"/>
-              <a:t>2/17/23</a:t>
+              <a:t>2/19/23</a:t>
             </a:fld>
             <a:endParaRPr lang="en-US" dirty="0"/>
           </a:p>
@@ -893,7 +895,7 @@
           <a:p>
             <a:fld id="{AD73FA9E-13CA-4D34-8989-6ECB15E9C63C}" type="datetime1">
               <a:rPr lang="en-US" smtClean="0"/>
-              <a:t>2/17/23</a:t>
+              <a:t>2/19/23</a:t>
             </a:fld>
             <a:endParaRPr lang="en-US" dirty="0"/>
           </a:p>
@@ -923,7 +925,7 @@
             <a:fld id="{78ADB214-F42C-4297-A187-8792AE2D2F13}" type="slidenum">
               <a:rPr lang="en-US" smtClean="0"/>
               <a:pPr/>
-              <a:t>10</a:t>
+              <a:t>12</a:t>
             </a:fld>
             <a:endParaRPr lang="en-US" dirty="0"/>
           </a:p>
@@ -9317,7 +9319,15 @@
           <a:p>
             <a:r>
               <a:rPr lang="en-US" dirty="0"/>
-              <a:t>32a – Clean Code – Singleton Pattern</a:t>
+              <a:t>32a – Clean Code – Singleton and </a:t>
+            </a:r>
+            <a:r>
+              <a:rPr lang="en-US" dirty="0" err="1"/>
+              <a:t>Monostate</a:t>
+            </a:r>
+            <a:r>
+              <a:rPr lang="en-US" dirty="0"/>
+              <a:t> Patterns</a:t>
             </a:r>
           </a:p>
         </p:txBody>
@@ -9342,6 +9352,509 @@
 </file>
 
 <file path=ppt/slides/slide10.xml><?xml version="1.0" encoding="utf-8"?>
+<p:sld xmlns:a="http://schemas.openxmlformats.org/drawingml/2006/main" xmlns:r="http://schemas.openxmlformats.org/officeDocument/2006/relationships" xmlns:p="http://schemas.openxmlformats.org/presentationml/2006/main">
+  <p:cSld>
+    <p:spTree>
+      <p:nvGrpSpPr>
+        <p:cNvPr id="1" name=""/>
+        <p:cNvGrpSpPr/>
+        <p:nvPr/>
+      </p:nvGrpSpPr>
+      <p:grpSpPr>
+        <a:xfrm>
+          <a:off x="0" y="0"/>
+          <a:ext cx="0" cy="0"/>
+          <a:chOff x="0" y="0"/>
+          <a:chExt cx="0" cy="0"/>
+        </a:xfrm>
+      </p:grpSpPr>
+      <p:sp>
+        <p:nvSpPr>
+          <p:cNvPr id="2" name="Title 1">
+            <a:extLst>
+              <a:ext uri="{FF2B5EF4-FFF2-40B4-BE49-F238E27FC236}">
+                <a16:creationId xmlns:a16="http://schemas.microsoft.com/office/drawing/2014/main" id="{88FD28AA-9D48-ADEB-D654-035C39A8807A}"/>
+              </a:ext>
+            </a:extLst>
+          </p:cNvPr>
+          <p:cNvSpPr>
+            <a:spLocks noGrp="1"/>
+          </p:cNvSpPr>
+          <p:nvPr>
+            <p:ph type="title"/>
+          </p:nvPr>
+        </p:nvSpPr>
+        <p:spPr/>
+        <p:txBody>
+          <a:bodyPr/>
+          <a:lstStyle/>
+          <a:p>
+            <a:r>
+              <a:rPr lang="en-US" dirty="0" err="1"/>
+              <a:t>Monostate</a:t>
+            </a:r>
+            <a:r>
+              <a:rPr lang="en-US" dirty="0"/>
+              <a:t> Pattern</a:t>
+            </a:r>
+          </a:p>
+        </p:txBody>
+      </p:sp>
+      <p:sp>
+        <p:nvSpPr>
+          <p:cNvPr id="5" name="TextBox 4">
+            <a:extLst>
+              <a:ext uri="{FF2B5EF4-FFF2-40B4-BE49-F238E27FC236}">
+                <a16:creationId xmlns:a16="http://schemas.microsoft.com/office/drawing/2014/main" id="{29F5A64A-A70B-BA23-9821-C25BA23AFE2A}"/>
+              </a:ext>
+            </a:extLst>
+          </p:cNvPr>
+          <p:cNvSpPr txBox="1"/>
+          <p:nvPr/>
+        </p:nvSpPr>
+        <p:spPr>
+          <a:xfrm>
+            <a:off x="1847528" y="1382551"/>
+            <a:ext cx="6097424" cy="646331"/>
+          </a:xfrm>
+          <a:prstGeom prst="rect">
+            <a:avLst/>
+          </a:prstGeom>
+          <a:solidFill>
+            <a:srgbClr val="FF7E79"/>
+          </a:solidFill>
+        </p:spPr>
+        <p:txBody>
+          <a:bodyPr wrap="square">
+            <a:spAutoFit/>
+          </a:bodyPr>
+          <a:lstStyle/>
+          <a:p>
+            <a:r>
+              <a:rPr lang="en-GB" sz="1800" dirty="0">
+                <a:solidFill>
+                  <a:srgbClr val="941651"/>
+                </a:solidFill>
+                <a:effectLst/>
+                <a:latin typeface="Calibri" panose="020F0502020204030204" pitchFamily="34" charset="0"/>
+                <a:ea typeface="Times New Roman" panose="02020603050405020304" pitchFamily="18" charset="0"/>
+                <a:cs typeface="Times New Roman" panose="02020603050405020304" pitchFamily="18" charset="0"/>
+              </a:rPr>
+              <a:t>Singleton pattern is great when you only want one of an instance like a ServiceRegistry</a:t>
+            </a:r>
+          </a:p>
+        </p:txBody>
+      </p:sp>
+      <p:sp>
+        <p:nvSpPr>
+          <p:cNvPr id="6" name="TextBox 5">
+            <a:extLst>
+              <a:ext uri="{FF2B5EF4-FFF2-40B4-BE49-F238E27FC236}">
+                <a16:creationId xmlns:a16="http://schemas.microsoft.com/office/drawing/2014/main" id="{341EF021-5EF5-18DD-D08E-56CC2E0B76D4}"/>
+              </a:ext>
+            </a:extLst>
+          </p:cNvPr>
+          <p:cNvSpPr txBox="1"/>
+          <p:nvPr/>
+        </p:nvSpPr>
+        <p:spPr>
+          <a:xfrm>
+            <a:off x="767408" y="2375131"/>
+            <a:ext cx="7600588" cy="646331"/>
+          </a:xfrm>
+          <a:prstGeom prst="rect">
+            <a:avLst/>
+          </a:prstGeom>
+          <a:solidFill>
+            <a:schemeClr val="accent1"/>
+          </a:solidFill>
+        </p:spPr>
+        <p:txBody>
+          <a:bodyPr wrap="square" rtlCol="0">
+            <a:spAutoFit/>
+          </a:bodyPr>
+          <a:lstStyle/>
+          <a:p>
+            <a:pPr>
+              <a:lnSpc>
+                <a:spcPct val="90000"/>
+              </a:lnSpc>
+              <a:spcBef>
+                <a:spcPts val="1200"/>
+              </a:spcBef>
+            </a:pPr>
+            <a:r>
+              <a:rPr lang="en-GB" sz="2000" dirty="0" err="1">
+                <a:solidFill>
+                  <a:srgbClr val="941651"/>
+                </a:solidFill>
+                <a:latin typeface="Calibri" panose="020F0502020204030204" pitchFamily="34" charset="0"/>
+                <a:cs typeface="Times New Roman" panose="02020603050405020304" pitchFamily="18" charset="0"/>
+              </a:rPr>
+              <a:t>Monostate</a:t>
+            </a:r>
+            <a:r>
+              <a:rPr lang="en-GB" sz="2000" dirty="0">
+                <a:solidFill>
+                  <a:srgbClr val="941651"/>
+                </a:solidFill>
+                <a:latin typeface="Calibri" panose="020F0502020204030204" pitchFamily="34" charset="0"/>
+                <a:cs typeface="Times New Roman" panose="02020603050405020304" pitchFamily="18" charset="0"/>
+              </a:rPr>
+              <a:t> Pattern is good if you only want one of an instance but you don’t want anyone else to know it is only one instance.</a:t>
+            </a:r>
+            <a:endParaRPr lang="en-US" sz="2000" dirty="0">
+              <a:solidFill>
+                <a:srgbClr val="941651"/>
+              </a:solidFill>
+            </a:endParaRPr>
+          </a:p>
+        </p:txBody>
+      </p:sp>
+    </p:spTree>
+    <p:extLst>
+      <p:ext uri="{BB962C8B-B14F-4D97-AF65-F5344CB8AC3E}">
+        <p14:creationId xmlns:p14="http://schemas.microsoft.com/office/powerpoint/2010/main" val="3828143397"/>
+      </p:ext>
+    </p:extLst>
+  </p:cSld>
+  <p:clrMapOvr>
+    <a:masterClrMapping/>
+  </p:clrMapOvr>
+  <p:transition>
+    <p:fade/>
+  </p:transition>
+</p:sld>
+</file>
+
+<file path=ppt/slides/slide11.xml><?xml version="1.0" encoding="utf-8"?>
+<p:sld xmlns:a="http://schemas.openxmlformats.org/drawingml/2006/main" xmlns:r="http://schemas.openxmlformats.org/officeDocument/2006/relationships" xmlns:p="http://schemas.openxmlformats.org/presentationml/2006/main">
+  <p:cSld>
+    <p:spTree>
+      <p:nvGrpSpPr>
+        <p:cNvPr id="1" name=""/>
+        <p:cNvGrpSpPr/>
+        <p:nvPr/>
+      </p:nvGrpSpPr>
+      <p:grpSpPr>
+        <a:xfrm>
+          <a:off x="0" y="0"/>
+          <a:ext cx="0" cy="0"/>
+          <a:chOff x="0" y="0"/>
+          <a:chExt cx="0" cy="0"/>
+        </a:xfrm>
+      </p:grpSpPr>
+      <p:sp>
+        <p:nvSpPr>
+          <p:cNvPr id="2" name="Title 1">
+            <a:extLst>
+              <a:ext uri="{FF2B5EF4-FFF2-40B4-BE49-F238E27FC236}">
+                <a16:creationId xmlns:a16="http://schemas.microsoft.com/office/drawing/2014/main" id="{88FD28AA-9D48-ADEB-D654-035C39A8807A}"/>
+              </a:ext>
+            </a:extLst>
+          </p:cNvPr>
+          <p:cNvSpPr>
+            <a:spLocks noGrp="1"/>
+          </p:cNvSpPr>
+          <p:nvPr>
+            <p:ph type="title"/>
+          </p:nvPr>
+        </p:nvSpPr>
+        <p:spPr/>
+        <p:txBody>
+          <a:bodyPr/>
+          <a:lstStyle/>
+          <a:p>
+            <a:r>
+              <a:rPr lang="en-US" dirty="0" err="1"/>
+              <a:t>Monostate</a:t>
+            </a:r>
+            <a:r>
+              <a:rPr lang="en-US" dirty="0"/>
+              <a:t> Pattern</a:t>
+            </a:r>
+          </a:p>
+        </p:txBody>
+      </p:sp>
+      <p:sp>
+        <p:nvSpPr>
+          <p:cNvPr id="5" name="TextBox 4">
+            <a:extLst>
+              <a:ext uri="{FF2B5EF4-FFF2-40B4-BE49-F238E27FC236}">
+                <a16:creationId xmlns:a16="http://schemas.microsoft.com/office/drawing/2014/main" id="{29F5A64A-A70B-BA23-9821-C25BA23AFE2A}"/>
+              </a:ext>
+            </a:extLst>
+          </p:cNvPr>
+          <p:cNvSpPr txBox="1"/>
+          <p:nvPr/>
+        </p:nvSpPr>
+        <p:spPr>
+          <a:xfrm>
+            <a:off x="876672" y="1628800"/>
+            <a:ext cx="3649152" cy="1200329"/>
+          </a:xfrm>
+          <a:prstGeom prst="rect">
+            <a:avLst/>
+          </a:prstGeom>
+          <a:solidFill>
+            <a:schemeClr val="accent3"/>
+          </a:solidFill>
+        </p:spPr>
+        <p:txBody>
+          <a:bodyPr wrap="square">
+            <a:spAutoFit/>
+          </a:bodyPr>
+          <a:lstStyle/>
+          <a:p>
+            <a:r>
+              <a:rPr lang="en-GB" sz="1800" dirty="0" err="1">
+                <a:solidFill>
+                  <a:schemeClr val="accent5">
+                    <a:lumMod val="20000"/>
+                    <a:lumOff val="80000"/>
+                  </a:schemeClr>
+                </a:solidFill>
+                <a:effectLst/>
+                <a:latin typeface="Calibri" panose="020F0502020204030204" pitchFamily="34" charset="0"/>
+                <a:ea typeface="Times New Roman" panose="02020603050405020304" pitchFamily="18" charset="0"/>
+                <a:cs typeface="Times New Roman" panose="02020603050405020304" pitchFamily="18" charset="0"/>
+              </a:rPr>
+              <a:t>Monostate</a:t>
+            </a:r>
+            <a:r>
+              <a:rPr lang="en-GB" sz="1800" dirty="0">
+                <a:solidFill>
+                  <a:schemeClr val="accent5">
+                    <a:lumMod val="20000"/>
+                    <a:lumOff val="80000"/>
+                  </a:schemeClr>
+                </a:solidFill>
+                <a:effectLst/>
+                <a:latin typeface="Calibri" panose="020F0502020204030204" pitchFamily="34" charset="0"/>
+                <a:ea typeface="Times New Roman" panose="02020603050405020304" pitchFamily="18" charset="0"/>
+                <a:cs typeface="Times New Roman" panose="02020603050405020304" pitchFamily="18" charset="0"/>
+              </a:rPr>
+              <a:t> pattern uses a public constructor so you can create many instances, but all the variables are held in a static map – see the code.</a:t>
+            </a:r>
+          </a:p>
+        </p:txBody>
+      </p:sp>
+      <p:pic>
+        <p:nvPicPr>
+          <p:cNvPr id="4" name="Picture 3">
+            <a:extLst>
+              <a:ext uri="{FF2B5EF4-FFF2-40B4-BE49-F238E27FC236}">
+                <a16:creationId xmlns:a16="http://schemas.microsoft.com/office/drawing/2014/main" id="{E852F5B6-BA59-1317-A4FF-548097C4AD31}"/>
+              </a:ext>
+            </a:extLst>
+          </p:cNvPr>
+          <p:cNvPicPr>
+            <a:picLocks noChangeAspect="1"/>
+          </p:cNvPicPr>
+          <p:nvPr/>
+        </p:nvPicPr>
+        <p:blipFill>
+          <a:blip r:embed="rId2"/>
+          <a:stretch>
+            <a:fillRect/>
+          </a:stretch>
+        </p:blipFill>
+        <p:spPr>
+          <a:xfrm>
+            <a:off x="5447928" y="1196752"/>
+            <a:ext cx="5867400" cy="5435600"/>
+          </a:xfrm>
+          <a:prstGeom prst="rect">
+            <a:avLst/>
+          </a:prstGeom>
+        </p:spPr>
+      </p:pic>
+      <p:cxnSp>
+        <p:nvCxnSpPr>
+          <p:cNvPr id="8" name="Straight Arrow Connector 7">
+            <a:extLst>
+              <a:ext uri="{FF2B5EF4-FFF2-40B4-BE49-F238E27FC236}">
+                <a16:creationId xmlns:a16="http://schemas.microsoft.com/office/drawing/2014/main" id="{92762B5F-DC15-1542-865A-CAE14F22CCD1}"/>
+              </a:ext>
+            </a:extLst>
+          </p:cNvPr>
+          <p:cNvCxnSpPr>
+            <a:cxnSpLocks/>
+          </p:cNvCxnSpPr>
+          <p:nvPr/>
+        </p:nvCxnSpPr>
+        <p:spPr>
+          <a:xfrm flipV="1">
+            <a:off x="4525824" y="1973992"/>
+            <a:ext cx="2866320" cy="446896"/>
+          </a:xfrm>
+          <a:prstGeom prst="straightConnector1">
+            <a:avLst/>
+          </a:prstGeom>
+          <a:ln>
+            <a:tailEnd type="triangle"/>
+          </a:ln>
+        </p:spPr>
+        <p:style>
+          <a:lnRef idx="1">
+            <a:schemeClr val="accent1"/>
+          </a:lnRef>
+          <a:fillRef idx="0">
+            <a:schemeClr val="accent1"/>
+          </a:fillRef>
+          <a:effectRef idx="0">
+            <a:schemeClr val="accent1"/>
+          </a:effectRef>
+          <a:fontRef idx="minor">
+            <a:schemeClr val="tx1"/>
+          </a:fontRef>
+        </p:style>
+      </p:cxnSp>
+      <p:sp>
+        <p:nvSpPr>
+          <p:cNvPr id="11" name="TextBox 10">
+            <a:extLst>
+              <a:ext uri="{FF2B5EF4-FFF2-40B4-BE49-F238E27FC236}">
+                <a16:creationId xmlns:a16="http://schemas.microsoft.com/office/drawing/2014/main" id="{A43104E6-9CAD-12C2-7677-D382E821BBA7}"/>
+              </a:ext>
+            </a:extLst>
+          </p:cNvPr>
+          <p:cNvSpPr txBox="1"/>
+          <p:nvPr/>
+        </p:nvSpPr>
+        <p:spPr>
+          <a:xfrm>
+            <a:off x="876672" y="3326290"/>
+            <a:ext cx="3649152" cy="1200329"/>
+          </a:xfrm>
+          <a:prstGeom prst="rect">
+            <a:avLst/>
+          </a:prstGeom>
+          <a:solidFill>
+            <a:srgbClr val="FF2F92"/>
+          </a:solidFill>
+        </p:spPr>
+        <p:txBody>
+          <a:bodyPr wrap="square">
+            <a:spAutoFit/>
+          </a:bodyPr>
+          <a:lstStyle/>
+          <a:p>
+            <a:r>
+              <a:rPr lang="en-GB" dirty="0">
+                <a:solidFill>
+                  <a:srgbClr val="002060"/>
+                </a:solidFill>
+                <a:latin typeface="Calibri" panose="020F0502020204030204" pitchFamily="34" charset="0"/>
+                <a:ea typeface="Times New Roman" panose="02020603050405020304" pitchFamily="18" charset="0"/>
+                <a:cs typeface="Times New Roman" panose="02020603050405020304" pitchFamily="18" charset="0"/>
+              </a:rPr>
+              <a:t>The state remains after all the instances have been destroyed – ready for the next instance to be created</a:t>
+            </a:r>
+            <a:endParaRPr lang="en-GB" sz="1800" dirty="0">
+              <a:solidFill>
+                <a:srgbClr val="002060"/>
+              </a:solidFill>
+              <a:effectLst/>
+              <a:latin typeface="Calibri" panose="020F0502020204030204" pitchFamily="34" charset="0"/>
+              <a:ea typeface="Times New Roman" panose="02020603050405020304" pitchFamily="18" charset="0"/>
+              <a:cs typeface="Times New Roman" panose="02020603050405020304" pitchFamily="18" charset="0"/>
+            </a:endParaRPr>
+          </a:p>
+        </p:txBody>
+      </p:sp>
+      <p:sp>
+        <p:nvSpPr>
+          <p:cNvPr id="12" name="TextBox 11">
+            <a:extLst>
+              <a:ext uri="{FF2B5EF4-FFF2-40B4-BE49-F238E27FC236}">
+                <a16:creationId xmlns:a16="http://schemas.microsoft.com/office/drawing/2014/main" id="{422B1BF2-6868-9A8C-9A41-B1337EFF57F9}"/>
+              </a:ext>
+            </a:extLst>
+          </p:cNvPr>
+          <p:cNvSpPr txBox="1"/>
+          <p:nvPr/>
+        </p:nvSpPr>
+        <p:spPr>
+          <a:xfrm>
+            <a:off x="876672" y="4869160"/>
+            <a:ext cx="3649152" cy="1200329"/>
+          </a:xfrm>
+          <a:prstGeom prst="rect">
+            <a:avLst/>
+          </a:prstGeom>
+          <a:solidFill>
+            <a:srgbClr val="7030A0"/>
+          </a:solidFill>
+        </p:spPr>
+        <p:txBody>
+          <a:bodyPr wrap="square">
+            <a:spAutoFit/>
+          </a:bodyPr>
+          <a:lstStyle/>
+          <a:p>
+            <a:r>
+              <a:rPr lang="en-GB" dirty="0">
+                <a:solidFill>
+                  <a:srgbClr val="F5EFD7"/>
+                </a:solidFill>
+                <a:latin typeface="Calibri" panose="020F0502020204030204" pitchFamily="34" charset="0"/>
+                <a:ea typeface="Times New Roman" panose="02020603050405020304" pitchFamily="18" charset="0"/>
+                <a:cs typeface="Times New Roman" panose="02020603050405020304" pitchFamily="18" charset="0"/>
+              </a:rPr>
+              <a:t>You can also create derivatives of the </a:t>
+            </a:r>
+            <a:r>
+              <a:rPr lang="en-GB" dirty="0" err="1">
+                <a:solidFill>
+                  <a:srgbClr val="F5EFD7"/>
+                </a:solidFill>
+                <a:latin typeface="Calibri" panose="020F0502020204030204" pitchFamily="34" charset="0"/>
+                <a:ea typeface="Times New Roman" panose="02020603050405020304" pitchFamily="18" charset="0"/>
+                <a:cs typeface="Times New Roman" panose="02020603050405020304" pitchFamily="18" charset="0"/>
+              </a:rPr>
+              <a:t>monostate</a:t>
+            </a:r>
+            <a:r>
+              <a:rPr lang="en-GB" dirty="0">
+                <a:solidFill>
+                  <a:srgbClr val="F5EFD7"/>
+                </a:solidFill>
+                <a:latin typeface="Calibri" panose="020F0502020204030204" pitchFamily="34" charset="0"/>
+                <a:ea typeface="Times New Roman" panose="02020603050405020304" pitchFamily="18" charset="0"/>
+                <a:cs typeface="Times New Roman" panose="02020603050405020304" pitchFamily="18" charset="0"/>
+              </a:rPr>
+              <a:t> class and have different policies for controlling the same information.</a:t>
+            </a:r>
+            <a:endParaRPr lang="en-GB" sz="1800" dirty="0">
+              <a:solidFill>
+                <a:srgbClr val="F5EFD7"/>
+              </a:solidFill>
+              <a:effectLst/>
+              <a:latin typeface="Calibri" panose="020F0502020204030204" pitchFamily="34" charset="0"/>
+              <a:ea typeface="Times New Roman" panose="02020603050405020304" pitchFamily="18" charset="0"/>
+              <a:cs typeface="Times New Roman" panose="02020603050405020304" pitchFamily="18" charset="0"/>
+            </a:endParaRPr>
+          </a:p>
+        </p:txBody>
+      </p:sp>
+    </p:spTree>
+    <p:extLst>
+      <p:ext uri="{BB962C8B-B14F-4D97-AF65-F5344CB8AC3E}">
+        <p14:creationId xmlns:p14="http://schemas.microsoft.com/office/powerpoint/2010/main" val="271340663"/>
+      </p:ext>
+    </p:extLst>
+  </p:cSld>
+  <p:clrMapOvr>
+    <a:masterClrMapping/>
+  </p:clrMapOvr>
+  <p:transition>
+    <p:fade/>
+  </p:transition>
+</p:sld>
+</file>
+
+<file path=ppt/slides/slide12.xml><?xml version="1.0" encoding="utf-8"?>
 <p:sld xmlns:a="http://schemas.openxmlformats.org/drawingml/2006/main" xmlns:r="http://schemas.openxmlformats.org/officeDocument/2006/relationships" xmlns:p="http://schemas.openxmlformats.org/presentationml/2006/main">
   <p:cSld>
     <p:spTree>
@@ -12661,15 +13174,6 @@
 </file>
 
 <file path=customXml/item1.xml><?xml version="1.0" encoding="utf-8"?>
-<?mso-contentType ?>
-<FormTemplates xmlns="http://schemas.microsoft.com/sharepoint/v3/contenttype/forms">
-  <Display>DocumentLibraryForm</Display>
-  <Edit>DocumentLibraryForm</Edit>
-  <New>DocumentLibraryForm</New>
-</FormTemplates>
-</file>
-
-<file path=customXml/item2.xml><?xml version="1.0" encoding="utf-8"?>
 <ct:contentTypeSchema xmlns:ct="http://schemas.microsoft.com/office/2006/metadata/contentType" xmlns:ma="http://schemas.microsoft.com/office/2006/metadata/properties/metaAttributes" ct:_="" ma:_="" ma:contentTypeName="Document" ma:contentTypeID="0x01010039F82FE1962BF246BB3FD51399502091" ma:contentTypeVersion="4" ma:contentTypeDescription="Create a new document." ma:contentTypeScope="" ma:versionID="a8c673c98f8b2fb74a666da82b1c2089">
   <xsd:schema xmlns:xsd="http://www.w3.org/2001/XMLSchema" xmlns:xs="http://www.w3.org/2001/XMLSchema" xmlns:p="http://schemas.microsoft.com/office/2006/metadata/properties" xmlns:ns2="87a905cf-b897-4a15-b4dd-a8e6e281c28b" xmlns:ns3="846e726d-930d-4acb-bd80-f2077a598691" targetNamespace="http://schemas.microsoft.com/office/2006/metadata/properties" ma:root="true" ma:fieldsID="5fda6c7244f85a62871e6aeadce43f09" ns2:_="" ns3:_="">
     <xsd:import namespace="87a905cf-b897-4a15-b4dd-a8e6e281c28b"/>
@@ -12834,6 +13338,15 @@
 </ct:contentTypeSchema>
 </file>
 
+<file path=customXml/item2.xml><?xml version="1.0" encoding="utf-8"?>
+<?mso-contentType ?>
+<FormTemplates xmlns="http://schemas.microsoft.com/sharepoint/v3/contenttype/forms">
+  <Display>DocumentLibraryForm</Display>
+  <Edit>DocumentLibraryForm</Edit>
+  <New>DocumentLibraryForm</New>
+</FormTemplates>
+</file>
+
 <file path=customXml/item3.xml><?xml version="1.0" encoding="utf-8"?>
 <p:properties xmlns:p="http://schemas.microsoft.com/office/2006/metadata/properties" xmlns:xsi="http://www.w3.org/2001/XMLSchema-instance" xmlns:pc="http://schemas.microsoft.com/office/infopath/2007/PartnerControls">
   <documentManagement>
@@ -12864,14 +13377,6 @@
 </file>
 
 <file path=customXml/itemProps1.xml><?xml version="1.0" encoding="utf-8"?>
-<ds:datastoreItem xmlns:ds="http://schemas.openxmlformats.org/officeDocument/2006/customXml" ds:itemID="{07F4FCAA-B58A-4119-AACD-7D2BC6BC457B}">
-  <ds:schemaRefs>
-    <ds:schemaRef ds:uri="http://schemas.microsoft.com/sharepoint/v3/contenttype/forms"/>
-  </ds:schemaRefs>
-</ds:datastoreItem>
-</file>
-
-<file path=customXml/itemProps2.xml><?xml version="1.0" encoding="utf-8"?>
 <ds:datastoreItem xmlns:ds="http://schemas.openxmlformats.org/officeDocument/2006/customXml" ds:itemID="{70E2D35C-61C5-4F1E-A268-B370BE907187}">
   <ds:schemaRefs>
     <ds:schemaRef ds:uri="http://schemas.microsoft.com/office/2006/metadata/contentType"/>
@@ -12890,6 +13395,14 @@
 </ds:datastoreItem>
 </file>
 
+<file path=customXml/itemProps2.xml><?xml version="1.0" encoding="utf-8"?>
+<ds:datastoreItem xmlns:ds="http://schemas.openxmlformats.org/officeDocument/2006/customXml" ds:itemID="{07F4FCAA-B58A-4119-AACD-7D2BC6BC457B}">
+  <ds:schemaRefs>
+    <ds:schemaRef ds:uri="http://schemas.microsoft.com/sharepoint/v3/contenttype/forms"/>
+  </ds:schemaRefs>
+</ds:datastoreItem>
+</file>
+
 <file path=customXml/itemProps3.xml><?xml version="1.0" encoding="utf-8"?>
 <ds:datastoreItem xmlns:ds="http://schemas.openxmlformats.org/officeDocument/2006/customXml" ds:itemID="{4F26828B-8021-40B0-BE6F-5F8BAA7A8160}">
   <ds:schemaRefs>

</xml_diff>